<commit_message>
Added diagram of modeling and alignment
</commit_message>
<xml_diff>
--- a/Documents/VIAAPPIAGIS_DIAGRAMS.pptx
+++ b/Documents/VIAAPPIAGIS_DIAGRAMS.pptx
@@ -7,6 +7,7 @@
   <p:sldIdLst>
     <p:sldId id="256" r:id="rId2"/>
     <p:sldId id="257" r:id="rId3"/>
+    <p:sldId id="258" r:id="rId4"/>
   </p:sldIdLst>
   <p:sldSz cx="12192000" cy="6858000"/>
   <p:notesSz cx="6858000" cy="9144000"/>
@@ -244,7 +245,7 @@
           <a:p>
             <a:fld id="{D40C2E48-D1B8-466A-A3E3-08AA69DCD239}" type="datetimeFigureOut">
               <a:rPr lang="en-US" smtClean="0"/>
-              <a:t>3/18/2015</a:t>
+              <a:t>4/28/2015</a:t>
             </a:fld>
             <a:endParaRPr lang="en-US"/>
           </a:p>
@@ -414,7 +415,7 @@
           <a:p>
             <a:fld id="{D40C2E48-D1B8-466A-A3E3-08AA69DCD239}" type="datetimeFigureOut">
               <a:rPr lang="en-US" smtClean="0"/>
-              <a:t>3/18/2015</a:t>
+              <a:t>4/28/2015</a:t>
             </a:fld>
             <a:endParaRPr lang="en-US"/>
           </a:p>
@@ -594,7 +595,7 @@
           <a:p>
             <a:fld id="{D40C2E48-D1B8-466A-A3E3-08AA69DCD239}" type="datetimeFigureOut">
               <a:rPr lang="en-US" smtClean="0"/>
-              <a:t>3/18/2015</a:t>
+              <a:t>4/28/2015</a:t>
             </a:fld>
             <a:endParaRPr lang="en-US"/>
           </a:p>
@@ -764,7 +765,7 @@
           <a:p>
             <a:fld id="{D40C2E48-D1B8-466A-A3E3-08AA69DCD239}" type="datetimeFigureOut">
               <a:rPr lang="en-US" smtClean="0"/>
-              <a:t>3/18/2015</a:t>
+              <a:t>4/28/2015</a:t>
             </a:fld>
             <a:endParaRPr lang="en-US"/>
           </a:p>
@@ -1010,7 +1011,7 @@
           <a:p>
             <a:fld id="{D40C2E48-D1B8-466A-A3E3-08AA69DCD239}" type="datetimeFigureOut">
               <a:rPr lang="en-US" smtClean="0"/>
-              <a:t>3/18/2015</a:t>
+              <a:t>4/28/2015</a:t>
             </a:fld>
             <a:endParaRPr lang="en-US"/>
           </a:p>
@@ -1242,7 +1243,7 @@
           <a:p>
             <a:fld id="{D40C2E48-D1B8-466A-A3E3-08AA69DCD239}" type="datetimeFigureOut">
               <a:rPr lang="en-US" smtClean="0"/>
-              <a:t>3/18/2015</a:t>
+              <a:t>4/28/2015</a:t>
             </a:fld>
             <a:endParaRPr lang="en-US"/>
           </a:p>
@@ -1609,7 +1610,7 @@
           <a:p>
             <a:fld id="{D40C2E48-D1B8-466A-A3E3-08AA69DCD239}" type="datetimeFigureOut">
               <a:rPr lang="en-US" smtClean="0"/>
-              <a:t>3/18/2015</a:t>
+              <a:t>4/28/2015</a:t>
             </a:fld>
             <a:endParaRPr lang="en-US"/>
           </a:p>
@@ -1727,7 +1728,7 @@
           <a:p>
             <a:fld id="{D40C2E48-D1B8-466A-A3E3-08AA69DCD239}" type="datetimeFigureOut">
               <a:rPr lang="en-US" smtClean="0"/>
-              <a:t>3/18/2015</a:t>
+              <a:t>4/28/2015</a:t>
             </a:fld>
             <a:endParaRPr lang="en-US"/>
           </a:p>
@@ -1822,7 +1823,7 @@
           <a:p>
             <a:fld id="{D40C2E48-D1B8-466A-A3E3-08AA69DCD239}" type="datetimeFigureOut">
               <a:rPr lang="en-US" smtClean="0"/>
-              <a:t>3/18/2015</a:t>
+              <a:t>4/28/2015</a:t>
             </a:fld>
             <a:endParaRPr lang="en-US"/>
           </a:p>
@@ -2099,7 +2100,7 @@
           <a:p>
             <a:fld id="{D40C2E48-D1B8-466A-A3E3-08AA69DCD239}" type="datetimeFigureOut">
               <a:rPr lang="en-US" smtClean="0"/>
-              <a:t>3/18/2015</a:t>
+              <a:t>4/28/2015</a:t>
             </a:fld>
             <a:endParaRPr lang="en-US"/>
           </a:p>
@@ -2352,7 +2353,7 @@
           <a:p>
             <a:fld id="{D40C2E48-D1B8-466A-A3E3-08AA69DCD239}" type="datetimeFigureOut">
               <a:rPr lang="en-US" smtClean="0"/>
-              <a:t>3/18/2015</a:t>
+              <a:t>4/28/2015</a:t>
             </a:fld>
             <a:endParaRPr lang="en-US"/>
           </a:p>
@@ -2565,7 +2566,7 @@
           <a:p>
             <a:fld id="{D40C2E48-D1B8-466A-A3E3-08AA69DCD239}" type="datetimeFigureOut">
               <a:rPr lang="en-US" smtClean="0"/>
-              <a:t>3/18/2015</a:t>
+              <a:t>4/28/2015</a:t>
             </a:fld>
             <a:endParaRPr lang="en-US"/>
           </a:p>
@@ -4320,11 +4321,7 @@
             <a:pPr algn="ctr"/>
             <a:r>
               <a:rPr lang="nl-NL" sz="1400" dirty="0" smtClean="0"/>
-              <a:t>Raw </a:t>
-            </a:r>
-            <a:r>
-              <a:rPr lang="nl-NL" sz="1400" dirty="0" smtClean="0"/>
-              <a:t>data</a:t>
+              <a:t>Raw data</a:t>
             </a:r>
             <a:endParaRPr lang="en-US" dirty="0"/>
           </a:p>
@@ -6523,13 +6520,8 @@
             <a:pPr algn="ctr"/>
             <a:r>
               <a:rPr lang="nl-NL" sz="1400" dirty="0" smtClean="0"/>
-              <a:t>WEB </a:t>
-            </a:r>
-            <a:r>
-              <a:rPr lang="nl-NL" sz="1400" dirty="0" smtClean="0"/>
-              <a:t>application</a:t>
-            </a:r>
-            <a:endParaRPr lang="nl-NL" sz="1400" dirty="0" smtClean="0"/>
+              <a:t>WEB application</a:t>
+            </a:r>
           </a:p>
         </p:txBody>
       </p:sp>
@@ -6558,13 +6550,8 @@
             <a:pPr algn="ctr"/>
             <a:r>
               <a:rPr lang="nl-NL" sz="1400" dirty="0" smtClean="0"/>
-              <a:t>Windows </a:t>
-            </a:r>
-            <a:r>
-              <a:rPr lang="nl-NL" sz="1400" dirty="0" smtClean="0"/>
-              <a:t>desktop application</a:t>
-            </a:r>
-            <a:endParaRPr lang="nl-NL" sz="1400" dirty="0" smtClean="0"/>
+              <a:t>Windows desktop application</a:t>
+            </a:r>
           </a:p>
         </p:txBody>
       </p:sp>
@@ -6733,13 +6720,8 @@
             <a:pPr algn="ctr"/>
             <a:r>
               <a:rPr lang="nl-NL" sz="1400" dirty="0" smtClean="0"/>
-              <a:t>WEB </a:t>
-            </a:r>
-            <a:r>
-              <a:rPr lang="nl-NL" sz="1400" dirty="0" smtClean="0"/>
-              <a:t>server</a:t>
-            </a:r>
-            <a:endParaRPr lang="nl-NL" sz="1400" dirty="0" smtClean="0"/>
+              <a:t>WEB server</a:t>
+            </a:r>
           </a:p>
         </p:txBody>
       </p:sp>
@@ -6791,6 +6773,763 @@
       </p:par>
     </p:tnLst>
   </p:timing>
+</p:sld>
+</file>
+
+<file path=ppt/slides/slide3.xml><?xml version="1.0" encoding="utf-8"?>
+<p:sld xmlns:a="http://schemas.openxmlformats.org/drawingml/2006/main" xmlns:r="http://schemas.openxmlformats.org/officeDocument/2006/relationships" xmlns:p="http://schemas.openxmlformats.org/presentationml/2006/main">
+  <p:cSld>
+    <p:spTree>
+      <p:nvGrpSpPr>
+        <p:cNvPr id="1" name=""/>
+        <p:cNvGrpSpPr/>
+        <p:nvPr/>
+      </p:nvGrpSpPr>
+      <p:grpSpPr>
+        <a:xfrm>
+          <a:off x="0" y="0"/>
+          <a:ext cx="0" cy="0"/>
+          <a:chOff x="0" y="0"/>
+          <a:chExt cx="0" cy="0"/>
+        </a:xfrm>
+      </p:grpSpPr>
+      <p:sp>
+        <p:nvSpPr>
+          <p:cNvPr id="19" name="Flowchart: Multidocument 18"/>
+          <p:cNvSpPr/>
+          <p:nvPr/>
+        </p:nvSpPr>
+        <p:spPr>
+          <a:xfrm>
+            <a:off x="5126191" y="1174116"/>
+            <a:ext cx="901522" cy="1043186"/>
+          </a:xfrm>
+          <a:prstGeom prst="flowChartMultidocument">
+            <a:avLst/>
+          </a:prstGeom>
+        </p:spPr>
+        <p:style>
+          <a:lnRef idx="2">
+            <a:schemeClr val="accent1">
+              <a:shade val="50000"/>
+            </a:schemeClr>
+          </a:lnRef>
+          <a:fillRef idx="1">
+            <a:schemeClr val="accent1"/>
+          </a:fillRef>
+          <a:effectRef idx="0">
+            <a:schemeClr val="accent1"/>
+          </a:effectRef>
+          <a:fontRef idx="minor">
+            <a:schemeClr val="lt1"/>
+          </a:fontRef>
+        </p:style>
+        <p:txBody>
+          <a:bodyPr rtlCol="0" anchor="ctr"/>
+          <a:lstStyle/>
+          <a:p>
+            <a:pPr algn="ctr"/>
+            <a:endParaRPr lang="en-US" sz="1600"/>
+          </a:p>
+        </p:txBody>
+      </p:sp>
+      <p:sp>
+        <p:nvSpPr>
+          <p:cNvPr id="20" name="TextBox 19"/>
+          <p:cNvSpPr txBox="1"/>
+          <p:nvPr/>
+        </p:nvSpPr>
+        <p:spPr>
+          <a:xfrm>
+            <a:off x="4958767" y="1434099"/>
+            <a:ext cx="1120462" cy="461665"/>
+          </a:xfrm>
+          <a:prstGeom prst="rect">
+            <a:avLst/>
+          </a:prstGeom>
+          <a:noFill/>
+        </p:spPr>
+        <p:txBody>
+          <a:bodyPr wrap="square" rtlCol="0">
+            <a:spAutoFit/>
+          </a:bodyPr>
+          <a:lstStyle/>
+          <a:p>
+            <a:pPr algn="ctr"/>
+            <a:r>
+              <a:rPr lang="nl-NL" sz="1200" dirty="0" smtClean="0"/>
+              <a:t>PC</a:t>
+            </a:r>
+          </a:p>
+          <a:p>
+            <a:pPr algn="ctr"/>
+            <a:r>
+              <a:rPr lang="nl-NL" sz="1200" dirty="0" smtClean="0"/>
+              <a:t>(LAS)</a:t>
+            </a:r>
+            <a:endParaRPr lang="en-US" sz="1200" dirty="0"/>
+          </a:p>
+        </p:txBody>
+      </p:sp>
+      <p:sp>
+        <p:nvSpPr>
+          <p:cNvPr id="23" name="Flowchart: Multidocument 22"/>
+          <p:cNvSpPr/>
+          <p:nvPr/>
+        </p:nvSpPr>
+        <p:spPr>
+          <a:xfrm>
+            <a:off x="953348" y="1692455"/>
+            <a:ext cx="901522" cy="1043186"/>
+          </a:xfrm>
+          <a:prstGeom prst="flowChartMultidocument">
+            <a:avLst/>
+          </a:prstGeom>
+        </p:spPr>
+        <p:style>
+          <a:lnRef idx="2">
+            <a:schemeClr val="accent1">
+              <a:shade val="50000"/>
+            </a:schemeClr>
+          </a:lnRef>
+          <a:fillRef idx="1">
+            <a:schemeClr val="accent1"/>
+          </a:fillRef>
+          <a:effectRef idx="0">
+            <a:schemeClr val="accent1"/>
+          </a:effectRef>
+          <a:fontRef idx="minor">
+            <a:schemeClr val="lt1"/>
+          </a:fontRef>
+        </p:style>
+        <p:txBody>
+          <a:bodyPr rtlCol="0" anchor="ctr"/>
+          <a:lstStyle/>
+          <a:p>
+            <a:pPr algn="ctr"/>
+            <a:endParaRPr lang="en-US"/>
+          </a:p>
+        </p:txBody>
+      </p:sp>
+      <p:sp>
+        <p:nvSpPr>
+          <p:cNvPr id="24" name="TextBox 23"/>
+          <p:cNvSpPr txBox="1"/>
+          <p:nvPr/>
+        </p:nvSpPr>
+        <p:spPr>
+          <a:xfrm>
+            <a:off x="769981" y="1943261"/>
+            <a:ext cx="1120462" cy="461665"/>
+          </a:xfrm>
+          <a:prstGeom prst="rect">
+            <a:avLst/>
+          </a:prstGeom>
+          <a:noFill/>
+        </p:spPr>
+        <p:txBody>
+          <a:bodyPr wrap="square" rtlCol="0">
+            <a:spAutoFit/>
+          </a:bodyPr>
+          <a:lstStyle/>
+          <a:p>
+            <a:pPr algn="ctr"/>
+            <a:r>
+              <a:rPr lang="nl-NL" sz="1200" dirty="0" smtClean="0"/>
+              <a:t>PICS</a:t>
+            </a:r>
+          </a:p>
+          <a:p>
+            <a:pPr algn="ctr"/>
+            <a:r>
+              <a:rPr lang="nl-NL" sz="1200" dirty="0" smtClean="0"/>
+              <a:t>(PNG,JPEG)</a:t>
+            </a:r>
+            <a:endParaRPr lang="en-US" sz="1200" dirty="0"/>
+          </a:p>
+        </p:txBody>
+      </p:sp>
+      <p:sp>
+        <p:nvSpPr>
+          <p:cNvPr id="56" name="Flowchart: Process 55"/>
+          <p:cNvSpPr/>
+          <p:nvPr/>
+        </p:nvSpPr>
+        <p:spPr>
+          <a:xfrm>
+            <a:off x="2506021" y="1857141"/>
+            <a:ext cx="1470342" cy="695460"/>
+          </a:xfrm>
+          <a:prstGeom prst="flowChartProcess">
+            <a:avLst/>
+          </a:prstGeom>
+        </p:spPr>
+        <p:style>
+          <a:lnRef idx="2">
+            <a:schemeClr val="accent1">
+              <a:shade val="50000"/>
+            </a:schemeClr>
+          </a:lnRef>
+          <a:fillRef idx="1">
+            <a:schemeClr val="accent1"/>
+          </a:fillRef>
+          <a:effectRef idx="0">
+            <a:schemeClr val="accent1"/>
+          </a:effectRef>
+          <a:fontRef idx="minor">
+            <a:schemeClr val="lt1"/>
+          </a:fontRef>
+        </p:style>
+        <p:txBody>
+          <a:bodyPr rtlCol="0" anchor="ctr"/>
+          <a:lstStyle/>
+          <a:p>
+            <a:pPr algn="ctr"/>
+            <a:r>
+              <a:rPr lang="nl-NL" sz="1600" dirty="0" smtClean="0"/>
+              <a:t>Automatic image-based modeling</a:t>
+            </a:r>
+            <a:endParaRPr lang="en-US" sz="1600" dirty="0"/>
+          </a:p>
+        </p:txBody>
+      </p:sp>
+      <p:sp>
+        <p:nvSpPr>
+          <p:cNvPr id="57" name="Flowchart: Multidocument 56"/>
+          <p:cNvSpPr/>
+          <p:nvPr/>
+        </p:nvSpPr>
+        <p:spPr>
+          <a:xfrm>
+            <a:off x="5080746" y="2477285"/>
+            <a:ext cx="901522" cy="1043186"/>
+          </a:xfrm>
+          <a:prstGeom prst="flowChartMultidocument">
+            <a:avLst/>
+          </a:prstGeom>
+        </p:spPr>
+        <p:style>
+          <a:lnRef idx="2">
+            <a:schemeClr val="accent1">
+              <a:shade val="50000"/>
+            </a:schemeClr>
+          </a:lnRef>
+          <a:fillRef idx="1">
+            <a:schemeClr val="accent1"/>
+          </a:fillRef>
+          <a:effectRef idx="0">
+            <a:schemeClr val="accent1"/>
+          </a:effectRef>
+          <a:fontRef idx="minor">
+            <a:schemeClr val="lt1"/>
+          </a:fontRef>
+        </p:style>
+        <p:txBody>
+          <a:bodyPr rtlCol="0" anchor="ctr"/>
+          <a:lstStyle/>
+          <a:p>
+            <a:pPr algn="ctr"/>
+            <a:endParaRPr lang="en-US" sz="1600"/>
+          </a:p>
+        </p:txBody>
+      </p:sp>
+      <p:sp>
+        <p:nvSpPr>
+          <p:cNvPr id="58" name="TextBox 57"/>
+          <p:cNvSpPr txBox="1"/>
+          <p:nvPr/>
+        </p:nvSpPr>
+        <p:spPr>
+          <a:xfrm>
+            <a:off x="4913322" y="2737268"/>
+            <a:ext cx="1120462" cy="461665"/>
+          </a:xfrm>
+          <a:prstGeom prst="rect">
+            <a:avLst/>
+          </a:prstGeom>
+          <a:noFill/>
+        </p:spPr>
+        <p:txBody>
+          <a:bodyPr wrap="square" rtlCol="0">
+            <a:spAutoFit/>
+          </a:bodyPr>
+          <a:lstStyle/>
+          <a:p>
+            <a:pPr algn="ctr"/>
+            <a:r>
+              <a:rPr lang="nl-NL" sz="1200" dirty="0" smtClean="0"/>
+              <a:t>MESH</a:t>
+            </a:r>
+          </a:p>
+          <a:p>
+            <a:pPr algn="ctr"/>
+            <a:r>
+              <a:rPr lang="nl-NL" sz="1200" dirty="0" smtClean="0"/>
+              <a:t>(OBJ)</a:t>
+            </a:r>
+            <a:endParaRPr lang="en-US" sz="1200" dirty="0"/>
+          </a:p>
+        </p:txBody>
+      </p:sp>
+      <p:sp>
+        <p:nvSpPr>
+          <p:cNvPr id="59" name="Flowchart: Process 58"/>
+          <p:cNvSpPr/>
+          <p:nvPr/>
+        </p:nvSpPr>
+        <p:spPr>
+          <a:xfrm>
+            <a:off x="6968578" y="1781825"/>
+            <a:ext cx="1470342" cy="695460"/>
+          </a:xfrm>
+          <a:prstGeom prst="flowChartProcess">
+            <a:avLst/>
+          </a:prstGeom>
+        </p:spPr>
+        <p:style>
+          <a:lnRef idx="2">
+            <a:schemeClr val="accent1">
+              <a:shade val="50000"/>
+            </a:schemeClr>
+          </a:lnRef>
+          <a:fillRef idx="1">
+            <a:schemeClr val="accent1"/>
+          </a:fillRef>
+          <a:effectRef idx="0">
+            <a:schemeClr val="accent1"/>
+          </a:effectRef>
+          <a:fontRef idx="minor">
+            <a:schemeClr val="lt1"/>
+          </a:fontRef>
+        </p:style>
+        <p:txBody>
+          <a:bodyPr rtlCol="0" anchor="ctr"/>
+          <a:lstStyle/>
+          <a:p>
+            <a:pPr algn="ctr"/>
+            <a:r>
+              <a:rPr lang="nl-NL" sz="1600" dirty="0" smtClean="0"/>
+              <a:t>Automatic alignment</a:t>
+            </a:r>
+            <a:endParaRPr lang="en-US" sz="1600" dirty="0"/>
+          </a:p>
+        </p:txBody>
+      </p:sp>
+      <p:sp>
+        <p:nvSpPr>
+          <p:cNvPr id="60" name="Flowchart: Multidocument 59"/>
+          <p:cNvSpPr/>
+          <p:nvPr/>
+        </p:nvSpPr>
+        <p:spPr>
+          <a:xfrm>
+            <a:off x="9556575" y="1174116"/>
+            <a:ext cx="901522" cy="1043186"/>
+          </a:xfrm>
+          <a:prstGeom prst="flowChartMultidocument">
+            <a:avLst/>
+          </a:prstGeom>
+        </p:spPr>
+        <p:style>
+          <a:lnRef idx="2">
+            <a:schemeClr val="accent1">
+              <a:shade val="50000"/>
+            </a:schemeClr>
+          </a:lnRef>
+          <a:fillRef idx="1">
+            <a:schemeClr val="accent1"/>
+          </a:fillRef>
+          <a:effectRef idx="0">
+            <a:schemeClr val="accent1"/>
+          </a:effectRef>
+          <a:fontRef idx="minor">
+            <a:schemeClr val="lt1"/>
+          </a:fontRef>
+        </p:style>
+        <p:txBody>
+          <a:bodyPr rtlCol="0" anchor="ctr"/>
+          <a:lstStyle/>
+          <a:p>
+            <a:pPr algn="ctr"/>
+            <a:endParaRPr lang="en-US" sz="1600"/>
+          </a:p>
+        </p:txBody>
+      </p:sp>
+      <p:sp>
+        <p:nvSpPr>
+          <p:cNvPr id="61" name="TextBox 60"/>
+          <p:cNvSpPr txBox="1"/>
+          <p:nvPr/>
+        </p:nvSpPr>
+        <p:spPr>
+          <a:xfrm>
+            <a:off x="9389151" y="1434099"/>
+            <a:ext cx="1120462" cy="461665"/>
+          </a:xfrm>
+          <a:prstGeom prst="rect">
+            <a:avLst/>
+          </a:prstGeom>
+          <a:noFill/>
+        </p:spPr>
+        <p:txBody>
+          <a:bodyPr wrap="square" rtlCol="0">
+            <a:spAutoFit/>
+          </a:bodyPr>
+          <a:lstStyle/>
+          <a:p>
+            <a:pPr algn="ctr"/>
+            <a:r>
+              <a:rPr lang="nl-NL" sz="1200" dirty="0" smtClean="0"/>
+              <a:t>PC</a:t>
+            </a:r>
+          </a:p>
+          <a:p>
+            <a:pPr algn="ctr"/>
+            <a:r>
+              <a:rPr lang="nl-NL" sz="1200" dirty="0" smtClean="0"/>
+              <a:t>(LAS)</a:t>
+            </a:r>
+            <a:endParaRPr lang="en-US" sz="1200" dirty="0"/>
+          </a:p>
+        </p:txBody>
+      </p:sp>
+      <p:sp>
+        <p:nvSpPr>
+          <p:cNvPr id="62" name="Flowchart: Multidocument 61"/>
+          <p:cNvSpPr/>
+          <p:nvPr/>
+        </p:nvSpPr>
+        <p:spPr>
+          <a:xfrm>
+            <a:off x="9511130" y="2477285"/>
+            <a:ext cx="901522" cy="1043186"/>
+          </a:xfrm>
+          <a:prstGeom prst="flowChartMultidocument">
+            <a:avLst/>
+          </a:prstGeom>
+        </p:spPr>
+        <p:style>
+          <a:lnRef idx="2">
+            <a:schemeClr val="accent1">
+              <a:shade val="50000"/>
+            </a:schemeClr>
+          </a:lnRef>
+          <a:fillRef idx="1">
+            <a:schemeClr val="accent1"/>
+          </a:fillRef>
+          <a:effectRef idx="0">
+            <a:schemeClr val="accent1"/>
+          </a:effectRef>
+          <a:fontRef idx="minor">
+            <a:schemeClr val="lt1"/>
+          </a:fontRef>
+        </p:style>
+        <p:txBody>
+          <a:bodyPr rtlCol="0" anchor="ctr"/>
+          <a:lstStyle/>
+          <a:p>
+            <a:pPr algn="ctr"/>
+            <a:endParaRPr lang="en-US" sz="1600"/>
+          </a:p>
+        </p:txBody>
+      </p:sp>
+      <p:sp>
+        <p:nvSpPr>
+          <p:cNvPr id="63" name="TextBox 62"/>
+          <p:cNvSpPr txBox="1"/>
+          <p:nvPr/>
+        </p:nvSpPr>
+        <p:spPr>
+          <a:xfrm>
+            <a:off x="9343706" y="2737268"/>
+            <a:ext cx="1120462" cy="461665"/>
+          </a:xfrm>
+          <a:prstGeom prst="rect">
+            <a:avLst/>
+          </a:prstGeom>
+          <a:noFill/>
+        </p:spPr>
+        <p:txBody>
+          <a:bodyPr wrap="square" rtlCol="0">
+            <a:spAutoFit/>
+          </a:bodyPr>
+          <a:lstStyle/>
+          <a:p>
+            <a:pPr algn="ctr"/>
+            <a:r>
+              <a:rPr lang="nl-NL" sz="1200" dirty="0" smtClean="0"/>
+              <a:t>MESH</a:t>
+            </a:r>
+          </a:p>
+          <a:p>
+            <a:pPr algn="ctr"/>
+            <a:r>
+              <a:rPr lang="nl-NL" sz="1200" dirty="0" smtClean="0"/>
+              <a:t>(OBJ)</a:t>
+            </a:r>
+            <a:endParaRPr lang="en-US" sz="1200" dirty="0"/>
+          </a:p>
+        </p:txBody>
+      </p:sp>
+      <p:cxnSp>
+        <p:nvCxnSpPr>
+          <p:cNvPr id="28" name="Straight Arrow Connector 27"/>
+          <p:cNvCxnSpPr>
+            <a:stCxn id="24" idx="3"/>
+          </p:cNvCxnSpPr>
+          <p:nvPr/>
+        </p:nvCxnSpPr>
+        <p:spPr>
+          <a:xfrm>
+            <a:off x="1890443" y="2174094"/>
+            <a:ext cx="593450" cy="39954"/>
+          </a:xfrm>
+          <a:prstGeom prst="straightConnector1">
+            <a:avLst/>
+          </a:prstGeom>
+          <a:ln w="50800">
+            <a:tailEnd type="triangle"/>
+          </a:ln>
+        </p:spPr>
+        <p:style>
+          <a:lnRef idx="1">
+            <a:schemeClr val="accent1"/>
+          </a:lnRef>
+          <a:fillRef idx="0">
+            <a:schemeClr val="accent1"/>
+          </a:fillRef>
+          <a:effectRef idx="0">
+            <a:schemeClr val="accent1"/>
+          </a:effectRef>
+          <a:fontRef idx="minor">
+            <a:schemeClr val="tx1"/>
+          </a:fontRef>
+        </p:style>
+      </p:cxnSp>
+      <p:cxnSp>
+        <p:nvCxnSpPr>
+          <p:cNvPr id="66" name="Elbow Connector 65"/>
+          <p:cNvCxnSpPr/>
+          <p:nvPr/>
+        </p:nvCxnSpPr>
+        <p:spPr>
+          <a:xfrm flipV="1">
+            <a:off x="4060770" y="1692455"/>
+            <a:ext cx="1013905" cy="532594"/>
+          </a:xfrm>
+          <a:prstGeom prst="bentConnector3">
+            <a:avLst>
+              <a:gd name="adj1" fmla="val 43270"/>
+            </a:avLst>
+          </a:prstGeom>
+          <a:ln w="50800">
+            <a:tailEnd type="triangle"/>
+          </a:ln>
+        </p:spPr>
+        <p:style>
+          <a:lnRef idx="1">
+            <a:schemeClr val="accent1"/>
+          </a:lnRef>
+          <a:fillRef idx="0">
+            <a:schemeClr val="accent1"/>
+          </a:fillRef>
+          <a:effectRef idx="0">
+            <a:schemeClr val="accent1"/>
+          </a:effectRef>
+          <a:fontRef idx="minor">
+            <a:schemeClr val="tx1"/>
+          </a:fontRef>
+        </p:style>
+      </p:cxnSp>
+      <p:cxnSp>
+        <p:nvCxnSpPr>
+          <p:cNvPr id="67" name="Elbow Connector 66"/>
+          <p:cNvCxnSpPr/>
+          <p:nvPr/>
+        </p:nvCxnSpPr>
+        <p:spPr>
+          <a:xfrm>
+            <a:off x="3976363" y="2225048"/>
+            <a:ext cx="1064158" cy="508966"/>
+          </a:xfrm>
+          <a:prstGeom prst="bentConnector3">
+            <a:avLst>
+              <a:gd name="adj1" fmla="val 50000"/>
+            </a:avLst>
+          </a:prstGeom>
+          <a:ln w="50800">
+            <a:tailEnd type="triangle"/>
+          </a:ln>
+        </p:spPr>
+        <p:style>
+          <a:lnRef idx="1">
+            <a:schemeClr val="accent1"/>
+          </a:lnRef>
+          <a:fillRef idx="0">
+            <a:schemeClr val="accent1"/>
+          </a:fillRef>
+          <a:effectRef idx="0">
+            <a:schemeClr val="accent1"/>
+          </a:effectRef>
+          <a:fontRef idx="minor">
+            <a:schemeClr val="tx1"/>
+          </a:fontRef>
+        </p:style>
+      </p:cxnSp>
+      <p:cxnSp>
+        <p:nvCxnSpPr>
+          <p:cNvPr id="77" name="Elbow Connector 76"/>
+          <p:cNvCxnSpPr>
+            <a:endCxn id="59" idx="1"/>
+          </p:cNvCxnSpPr>
+          <p:nvPr/>
+        </p:nvCxnSpPr>
+        <p:spPr>
+          <a:xfrm>
+            <a:off x="6105224" y="1665444"/>
+            <a:ext cx="863354" cy="464111"/>
+          </a:xfrm>
+          <a:prstGeom prst="bentConnector3">
+            <a:avLst>
+              <a:gd name="adj1" fmla="val 50000"/>
+            </a:avLst>
+          </a:prstGeom>
+          <a:ln w="50800">
+            <a:tailEnd type="triangle"/>
+          </a:ln>
+        </p:spPr>
+        <p:style>
+          <a:lnRef idx="1">
+            <a:schemeClr val="accent1"/>
+          </a:lnRef>
+          <a:fillRef idx="0">
+            <a:schemeClr val="accent1"/>
+          </a:fillRef>
+          <a:effectRef idx="0">
+            <a:schemeClr val="accent1"/>
+          </a:effectRef>
+          <a:fontRef idx="minor">
+            <a:schemeClr val="tx1"/>
+          </a:fontRef>
+        </p:style>
+      </p:cxnSp>
+      <p:cxnSp>
+        <p:nvCxnSpPr>
+          <p:cNvPr id="78" name="Elbow Connector 77"/>
+          <p:cNvCxnSpPr>
+            <a:endCxn id="59" idx="1"/>
+          </p:cNvCxnSpPr>
+          <p:nvPr/>
+        </p:nvCxnSpPr>
+        <p:spPr>
+          <a:xfrm flipV="1">
+            <a:off x="6033784" y="2129555"/>
+            <a:ext cx="934794" cy="607713"/>
+          </a:xfrm>
+          <a:prstGeom prst="bentConnector3">
+            <a:avLst>
+              <a:gd name="adj1" fmla="val 54380"/>
+            </a:avLst>
+          </a:prstGeom>
+          <a:ln w="50800">
+            <a:tailEnd type="triangle"/>
+          </a:ln>
+        </p:spPr>
+        <p:style>
+          <a:lnRef idx="1">
+            <a:schemeClr val="accent1"/>
+          </a:lnRef>
+          <a:fillRef idx="0">
+            <a:schemeClr val="accent1"/>
+          </a:fillRef>
+          <a:effectRef idx="0">
+            <a:schemeClr val="accent1"/>
+          </a:effectRef>
+          <a:fontRef idx="minor">
+            <a:schemeClr val="tx1"/>
+          </a:fontRef>
+        </p:style>
+      </p:cxnSp>
+      <p:cxnSp>
+        <p:nvCxnSpPr>
+          <p:cNvPr id="85" name="Elbow Connector 84"/>
+          <p:cNvCxnSpPr/>
+          <p:nvPr/>
+        </p:nvCxnSpPr>
+        <p:spPr>
+          <a:xfrm flipV="1">
+            <a:off x="8523327" y="1690209"/>
+            <a:ext cx="1013905" cy="532594"/>
+          </a:xfrm>
+          <a:prstGeom prst="bentConnector3">
+            <a:avLst>
+              <a:gd name="adj1" fmla="val 43270"/>
+            </a:avLst>
+          </a:prstGeom>
+          <a:ln w="50800">
+            <a:tailEnd type="triangle"/>
+          </a:ln>
+        </p:spPr>
+        <p:style>
+          <a:lnRef idx="1">
+            <a:schemeClr val="accent1"/>
+          </a:lnRef>
+          <a:fillRef idx="0">
+            <a:schemeClr val="accent1"/>
+          </a:fillRef>
+          <a:effectRef idx="0">
+            <a:schemeClr val="accent1"/>
+          </a:effectRef>
+          <a:fontRef idx="minor">
+            <a:schemeClr val="tx1"/>
+          </a:fontRef>
+        </p:style>
+      </p:cxnSp>
+      <p:cxnSp>
+        <p:nvCxnSpPr>
+          <p:cNvPr id="86" name="Elbow Connector 85"/>
+          <p:cNvCxnSpPr/>
+          <p:nvPr/>
+        </p:nvCxnSpPr>
+        <p:spPr>
+          <a:xfrm>
+            <a:off x="8438920" y="2222802"/>
+            <a:ext cx="1064158" cy="508966"/>
+          </a:xfrm>
+          <a:prstGeom prst="bentConnector3">
+            <a:avLst>
+              <a:gd name="adj1" fmla="val 50000"/>
+            </a:avLst>
+          </a:prstGeom>
+          <a:ln w="50800">
+            <a:tailEnd type="triangle"/>
+          </a:ln>
+        </p:spPr>
+        <p:style>
+          <a:lnRef idx="1">
+            <a:schemeClr val="accent1"/>
+          </a:lnRef>
+          <a:fillRef idx="0">
+            <a:schemeClr val="accent1"/>
+          </a:fillRef>
+          <a:effectRef idx="0">
+            <a:schemeClr val="accent1"/>
+          </a:effectRef>
+          <a:fontRef idx="minor">
+            <a:schemeClr val="tx1"/>
+          </a:fontRef>
+        </p:style>
+      </p:cxnSp>
+    </p:spTree>
+    <p:extLst>
+      <p:ext uri="{BB962C8B-B14F-4D97-AF65-F5344CB8AC3E}">
+        <p14:creationId xmlns:p14="http://schemas.microsoft.com/office/powerpoint/2010/main" val="3421199071"/>
+      </p:ext>
+    </p:extLst>
+  </p:cSld>
+  <p:clrMapOvr>
+    <a:masterClrMapping/>
+  </p:clrMapOvr>
 </p:sld>
 </file>
 

</xml_diff>